<commit_message>
Updated slides for python read/write data section
</commit_message>
<xml_diff>
--- a/python-data/slides/04_binary_formats.pptx
+++ b/python-data/slides/04_binary_formats.pptx
@@ -259,7 +259,7 @@
               <a:pPr>
                 <a:defRPr/>
               </a:pPr>
-              <a:t>09/10/2018</a:t>
+              <a:t>28/02/2023</a:t>
             </a:fld>
             <a:endParaRPr lang="en-GB" dirty="0"/>
           </a:p>
@@ -295,7 +295,7 @@
           <a:lstStyle/>
           <a:p>
             <a:pPr lvl="0"/>
-            <a:endParaRPr lang="en-GB" noProof="0" smtClean="0"/>
+            <a:endParaRPr lang="en-GB" noProof="0"/>
           </a:p>
         </p:txBody>
       </p:sp>
@@ -324,38 +324,38 @@
           <a:p>
             <a:pPr lvl="0"/>
             <a:r>
-              <a:rPr lang="en-US" noProof="0" smtClean="0"/>
+              <a:rPr lang="en-US" noProof="0"/>
               <a:t>Click to edit Master text styles</a:t>
             </a:r>
           </a:p>
           <a:p>
             <a:pPr lvl="1"/>
             <a:r>
-              <a:rPr lang="en-US" noProof="0" smtClean="0"/>
+              <a:rPr lang="en-US" noProof="0"/>
               <a:t>Second level</a:t>
             </a:r>
           </a:p>
           <a:p>
             <a:pPr lvl="2"/>
             <a:r>
-              <a:rPr lang="en-US" noProof="0" smtClean="0"/>
+              <a:rPr lang="en-US" noProof="0"/>
               <a:t>Third level</a:t>
             </a:r>
           </a:p>
           <a:p>
             <a:pPr lvl="3"/>
             <a:r>
-              <a:rPr lang="en-US" noProof="0" smtClean="0"/>
+              <a:rPr lang="en-US" noProof="0"/>
               <a:t>Fourth level</a:t>
             </a:r>
           </a:p>
           <a:p>
             <a:pPr lvl="4"/>
             <a:r>
-              <a:rPr lang="en-US" noProof="0" smtClean="0"/>
+              <a:rPr lang="en-US" noProof="0"/>
               <a:t>Fifth level</a:t>
             </a:r>
-            <a:endParaRPr lang="en-GB" noProof="0" smtClean="0"/>
+            <a:endParaRPr lang="en-GB" noProof="0"/>
           </a:p>
         </p:txBody>
       </p:sp>
@@ -669,7 +669,7 @@
                 <a:spcPct val="0"/>
               </a:spcBef>
             </a:pPr>
-            <a:endParaRPr lang="en-GB" altLang="en-US" smtClean="0"/>
+            <a:endParaRPr lang="en-GB" altLang="en-US"/>
           </a:p>
         </p:txBody>
       </p:sp>
@@ -944,7 +944,7 @@
                 <a:spcPct val="0"/>
               </a:spcBef>
             </a:pPr>
-            <a:endParaRPr lang="en-GB" altLang="en-US" smtClean="0"/>
+            <a:endParaRPr lang="en-GB" altLang="en-US"/>
           </a:p>
         </p:txBody>
       </p:sp>
@@ -1219,7 +1219,7 @@
                 <a:spcPct val="0"/>
               </a:spcBef>
             </a:pPr>
-            <a:endParaRPr lang="en-GB" altLang="en-US" smtClean="0"/>
+            <a:endParaRPr lang="en-GB" altLang="en-US"/>
           </a:p>
         </p:txBody>
       </p:sp>
@@ -1610,7 +1610,7 @@
           </a:lstStyle>
           <a:p>
             <a:r>
-              <a:rPr lang="en-US" smtClean="0"/>
+              <a:rPr lang="en-US"/>
               <a:t>Click to edit Master title style</a:t>
             </a:r>
             <a:endParaRPr lang="en-US" dirty="0"/>
@@ -1686,7 +1686,7 @@
           </a:lstStyle>
           <a:p>
             <a:r>
-              <a:rPr lang="en-US" smtClean="0"/>
+              <a:rPr lang="en-US"/>
               <a:t>Click to edit Master subtitle style</a:t>
             </a:r>
             <a:endParaRPr lang="en-US" dirty="0"/>
@@ -1792,7 +1792,7 @@
           </a:lstStyle>
           <a:p>
             <a:r>
-              <a:rPr lang="en-US" smtClean="0"/>
+              <a:rPr lang="en-US"/>
               <a:t>Click to edit Master title style</a:t>
             </a:r>
             <a:endParaRPr lang="en-US" dirty="0"/>
@@ -1839,7 +1839,7 @@
           <a:p>
             <a:pPr lvl="0"/>
             <a:r>
-              <a:rPr lang="en-US" noProof="0" dirty="0" smtClean="0"/>
+              <a:rPr lang="en-US" noProof="0" dirty="0"/>
               <a:t>Click icon to add picture</a:t>
             </a:r>
             <a:endParaRPr lang="en-GB" noProof="0" dirty="0"/>
@@ -1897,28 +1897,28 @@
           <a:p>
             <a:pPr lvl="0"/>
             <a:r>
-              <a:rPr lang="en-US" smtClean="0"/>
+              <a:rPr lang="en-US"/>
               <a:t>Edit Master text styles</a:t>
             </a:r>
           </a:p>
           <a:p>
             <a:pPr lvl="1"/>
             <a:r>
-              <a:rPr lang="en-US" smtClean="0"/>
+              <a:rPr lang="en-US"/>
               <a:t>Second level</a:t>
             </a:r>
           </a:p>
           <a:p>
             <a:pPr lvl="2"/>
             <a:r>
-              <a:rPr lang="en-US" smtClean="0"/>
+              <a:rPr lang="en-US"/>
               <a:t>Third level</a:t>
             </a:r>
           </a:p>
           <a:p>
             <a:pPr lvl="3"/>
             <a:r>
-              <a:rPr lang="en-US" smtClean="0"/>
+              <a:rPr lang="en-US"/>
               <a:t>Fourth level</a:t>
             </a:r>
           </a:p>
@@ -2023,7 +2023,7 @@
           </a:lstStyle>
           <a:p>
             <a:r>
-              <a:rPr lang="en-US" smtClean="0"/>
+              <a:rPr lang="en-US"/>
               <a:t>Click to edit Master title style</a:t>
             </a:r>
             <a:endParaRPr lang="en-US" dirty="0"/>
@@ -2081,28 +2081,28 @@
           <a:p>
             <a:pPr lvl="0"/>
             <a:r>
-              <a:rPr lang="en-US" smtClean="0"/>
+              <a:rPr lang="en-US"/>
               <a:t>Edit Master text styles</a:t>
             </a:r>
           </a:p>
           <a:p>
             <a:pPr lvl="1"/>
             <a:r>
-              <a:rPr lang="en-US" smtClean="0"/>
+              <a:rPr lang="en-US"/>
               <a:t>Second level</a:t>
             </a:r>
           </a:p>
           <a:p>
             <a:pPr lvl="2"/>
             <a:r>
-              <a:rPr lang="en-US" smtClean="0"/>
+              <a:rPr lang="en-US"/>
               <a:t>Third level</a:t>
             </a:r>
           </a:p>
           <a:p>
             <a:pPr lvl="3"/>
             <a:r>
-              <a:rPr lang="en-US" smtClean="0"/>
+              <a:rPr lang="en-US"/>
               <a:t>Fourth level</a:t>
             </a:r>
           </a:p>
@@ -2182,7 +2182,7 @@
           </a:lstStyle>
           <a:p>
             <a:r>
-              <a:rPr lang="en-US" smtClean="0"/>
+              <a:rPr lang="en-US"/>
               <a:t>Click to edit Master title style</a:t>
             </a:r>
             <a:endParaRPr lang="en-US" dirty="0"/>
@@ -2256,7 +2256,7 @@
           </a:lstStyle>
           <a:p>
             <a:r>
-              <a:rPr lang="en-US" smtClean="0"/>
+              <a:rPr lang="en-US"/>
               <a:t>Click to edit Master subtitle style</a:t>
             </a:r>
             <a:endParaRPr lang="en-US" dirty="0"/>
@@ -2328,7 +2328,7 @@
               <a:pPr>
                 <a:defRPr/>
               </a:pPr>
-              <a:t>09/10/2018</a:t>
+              <a:t>28/02/2023</a:t>
             </a:fld>
             <a:endParaRPr lang="en-GB" dirty="0"/>
           </a:p>
@@ -2665,35 +2665,35 @@
           <a:p>
             <a:pPr lvl="0"/>
             <a:r>
-              <a:rPr lang="en-US" altLang="en-US" smtClean="0"/>
+              <a:rPr lang="en-US" altLang="en-US"/>
               <a:t>Edit Master text styles</a:t>
             </a:r>
           </a:p>
           <a:p>
             <a:pPr lvl="1"/>
             <a:r>
-              <a:rPr lang="en-US" altLang="en-US" smtClean="0"/>
+              <a:rPr lang="en-US" altLang="en-US"/>
               <a:t>Second level</a:t>
             </a:r>
           </a:p>
           <a:p>
             <a:pPr lvl="2"/>
             <a:r>
-              <a:rPr lang="en-US" altLang="en-US" smtClean="0"/>
+              <a:rPr lang="en-US" altLang="en-US"/>
               <a:t>Third level</a:t>
             </a:r>
           </a:p>
           <a:p>
             <a:pPr lvl="3"/>
             <a:r>
-              <a:rPr lang="en-US" altLang="en-US" smtClean="0"/>
+              <a:rPr lang="en-US" altLang="en-US"/>
               <a:t>Fourth level</a:t>
             </a:r>
           </a:p>
           <a:p>
             <a:pPr lvl="4"/>
             <a:r>
-              <a:rPr lang="en-US" altLang="en-US" smtClean="0"/>
+              <a:rPr lang="en-US" altLang="en-US"/>
               <a:t>Fifth level</a:t>
             </a:r>
           </a:p>
@@ -2911,10 +2911,10 @@
           <a:p>
             <a:pPr lvl="0"/>
             <a:r>
-              <a:rPr lang="en-US" altLang="en-US" smtClean="0"/>
+              <a:rPr lang="en-US" altLang="en-US"/>
               <a:t>Click to edit Master title style</a:t>
             </a:r>
-            <a:endParaRPr lang="en-GB" altLang="en-US" smtClean="0"/>
+            <a:endParaRPr lang="en-GB" altLang="en-US"/>
           </a:p>
         </p:txBody>
       </p:sp>
@@ -3410,7 +3410,7 @@
           <a:lstStyle/>
           <a:p>
             <a:r>
-              <a:rPr lang="en-GB" altLang="en-US" smtClean="0"/>
+              <a:rPr lang="en-GB" altLang="en-US"/>
               <a:t>Read and Write Data</a:t>
             </a:r>
           </a:p>
@@ -3437,7 +3437,7 @@
           <a:lstStyle/>
           <a:p>
             <a:r>
-              <a:rPr lang="en-GB" altLang="en-US" smtClean="0"/>
+              <a:rPr lang="en-GB" altLang="en-US"/>
               <a:t>Working with data: binary formats</a:t>
             </a:r>
           </a:p>
@@ -4658,7 +4658,7 @@
               <a:defRPr/>
             </a:pPr>
             <a:r>
-              <a:rPr lang="en-GB" altLang="en-US" dirty="0" smtClean="0">
+              <a:rPr lang="en-GB" altLang="en-US" dirty="0">
                 <a:cs typeface="Calibri" panose="020F0502020204030204" pitchFamily="34" charset="0"/>
               </a:rPr>
               <a:t>It is easy to create binary format using Python, e.g.:</a:t>
@@ -4676,7 +4676,7 @@
               <a:buNone/>
               <a:defRPr/>
             </a:pPr>
-            <a:endParaRPr lang="en-GB" altLang="en-US" dirty="0" smtClean="0">
+            <a:endParaRPr lang="en-GB" altLang="en-US" dirty="0">
               <a:cs typeface="Calibri" panose="020F0502020204030204" pitchFamily="34" charset="0"/>
             </a:endParaRPr>
           </a:p>
@@ -4693,42 +4693,42 @@
               <a:defRPr/>
             </a:pPr>
             <a:r>
-              <a:rPr lang="en-GB" altLang="en-US" sz="2000" b="1" dirty="0" smtClean="0">
+              <a:rPr lang="en-GB" altLang="en-US" sz="2000" b="1" dirty="0">
                 <a:latin typeface="Courier New" pitchFamily="49" charset="0"/>
                 <a:cs typeface="Courier New" pitchFamily="49" charset="0"/>
               </a:rPr>
               <a:t>&gt;&gt;&gt;</a:t>
             </a:r>
             <a:r>
-              <a:rPr lang="en-GB" altLang="en-US" sz="2000" dirty="0" smtClean="0">
+              <a:rPr lang="en-GB" altLang="en-US" sz="2000" dirty="0">
                 <a:latin typeface="Courier New" pitchFamily="49" charset="0"/>
                 <a:cs typeface="Courier New" pitchFamily="49" charset="0"/>
               </a:rPr>
               <a:t> </a:t>
             </a:r>
             <a:r>
-              <a:rPr lang="en-GB" altLang="en-US" sz="2000" b="1" dirty="0" smtClean="0">
+              <a:rPr lang="en-GB" altLang="en-US" sz="2000" b="1" dirty="0">
                 <a:latin typeface="Courier New" pitchFamily="49" charset="0"/>
                 <a:cs typeface="Courier New" pitchFamily="49" charset="0"/>
               </a:rPr>
               <a:t>import</a:t>
             </a:r>
             <a:r>
-              <a:rPr lang="en-GB" altLang="en-US" sz="2000" dirty="0" smtClean="0">
+              <a:rPr lang="en-GB" altLang="en-US" sz="2000" dirty="0">
                 <a:latin typeface="Courier New" pitchFamily="49" charset="0"/>
                 <a:cs typeface="Courier New" pitchFamily="49" charset="0"/>
               </a:rPr>
               <a:t> </a:t>
             </a:r>
             <a:r>
-              <a:rPr lang="en-GB" altLang="en-US" sz="2000" dirty="0" err="1" smtClean="0">
+              <a:rPr lang="en-GB" altLang="en-US" sz="2000" dirty="0" err="1">
                 <a:latin typeface="Courier New" pitchFamily="49" charset="0"/>
                 <a:cs typeface="Courier New" pitchFamily="49" charset="0"/>
               </a:rPr>
               <a:t>struct</a:t>
             </a:r>
             <a:r>
-              <a:rPr lang="en-GB" altLang="en-US" sz="2000" dirty="0" smtClean="0">
+              <a:rPr lang="en-GB" altLang="en-US" sz="2000" dirty="0">
                 <a:latin typeface="Courier New" pitchFamily="49" charset="0"/>
                 <a:cs typeface="Courier New" pitchFamily="49" charset="0"/>
               </a:rPr>
@@ -4748,14 +4748,14 @@
               <a:defRPr/>
             </a:pPr>
             <a:r>
-              <a:rPr lang="en-GB" altLang="en-US" sz="2000" b="1" dirty="0" smtClean="0">
+              <a:rPr lang="en-GB" altLang="en-US" sz="2000" b="1" dirty="0">
                 <a:latin typeface="Courier New" pitchFamily="49" charset="0"/>
                 <a:cs typeface="Courier New" pitchFamily="49" charset="0"/>
               </a:rPr>
               <a:t>&gt;&gt;&gt;</a:t>
             </a:r>
             <a:r>
-              <a:rPr lang="en-GB" altLang="en-US" sz="2000" dirty="0" smtClean="0">
+              <a:rPr lang="en-GB" altLang="en-US" sz="2000" dirty="0">
                 <a:latin typeface="Courier New" pitchFamily="49" charset="0"/>
                 <a:cs typeface="Courier New" pitchFamily="49" charset="0"/>
               </a:rPr>
@@ -4775,84 +4775,56 @@
               <a:defRPr/>
             </a:pPr>
             <a:r>
-              <a:rPr lang="en-GB" altLang="en-US" sz="2000" b="1" dirty="0" smtClean="0">
+              <a:rPr lang="en-GB" altLang="en-US" sz="2000" b="1" dirty="0">
                 <a:latin typeface="Courier New" pitchFamily="49" charset="0"/>
                 <a:cs typeface="Courier New" pitchFamily="49" charset="0"/>
               </a:rPr>
               <a:t>&gt;&gt;&gt;</a:t>
             </a:r>
             <a:r>
-              <a:rPr lang="en-GB" altLang="en-US" sz="2000" dirty="0" smtClean="0">
+              <a:rPr lang="en-GB" altLang="en-US" sz="2000" dirty="0">
                 <a:latin typeface="Courier New" pitchFamily="49" charset="0"/>
                 <a:cs typeface="Courier New" pitchFamily="49" charset="0"/>
               </a:rPr>
               <a:t> </a:t>
             </a:r>
             <a:r>
-              <a:rPr lang="en-GB" altLang="en-US" sz="2000" dirty="0" err="1" smtClean="0">
+              <a:rPr lang="en-GB" altLang="en-US" sz="2000" dirty="0" err="1">
                 <a:latin typeface="Courier New" pitchFamily="49" charset="0"/>
                 <a:cs typeface="Courier New" pitchFamily="49" charset="0"/>
               </a:rPr>
               <a:t>my_data</a:t>
             </a:r>
             <a:r>
-              <a:rPr lang="en-GB" altLang="en-US" sz="2000" dirty="0" smtClean="0">
+              <a:rPr lang="en-GB" altLang="en-US" sz="2000" dirty="0">
                 <a:latin typeface="Courier New" pitchFamily="49" charset="0"/>
                 <a:cs typeface="Courier New" pitchFamily="49" charset="0"/>
               </a:rPr>
-              <a:t> = [float(</a:t>
-            </a:r>
-            <a:r>
-              <a:rPr lang="en-GB" altLang="en-US" sz="2000" dirty="0" err="1" smtClean="0">
+              <a:t> = [float(i) </a:t>
+            </a:r>
+            <a:r>
+              <a:rPr lang="en-GB" altLang="en-US" sz="2000" b="1" dirty="0">
                 <a:latin typeface="Courier New" pitchFamily="49" charset="0"/>
                 <a:cs typeface="Courier New" pitchFamily="49" charset="0"/>
               </a:rPr>
-              <a:t>i</a:t>
-            </a:r>
-            <a:r>
-              <a:rPr lang="en-GB" altLang="en-US" sz="2000" dirty="0" smtClean="0">
+              <a:t>for</a:t>
+            </a:r>
+            <a:r>
+              <a:rPr lang="en-GB" altLang="en-US" sz="2000" dirty="0">
                 <a:latin typeface="Courier New" pitchFamily="49" charset="0"/>
                 <a:cs typeface="Courier New" pitchFamily="49" charset="0"/>
               </a:rPr>
-              <a:t>) </a:t>
-            </a:r>
-            <a:r>
-              <a:rPr lang="en-GB" altLang="en-US" sz="2000" b="1" dirty="0" smtClean="0">
+              <a:t> i </a:t>
+            </a:r>
+            <a:r>
+              <a:rPr lang="en-GB" altLang="en-US" sz="2000" b="1" dirty="0">
                 <a:latin typeface="Courier New" pitchFamily="49" charset="0"/>
                 <a:cs typeface="Courier New" pitchFamily="49" charset="0"/>
               </a:rPr>
-              <a:t>for</a:t>
-            </a:r>
-            <a:r>
-              <a:rPr lang="en-GB" altLang="en-US" sz="2000" dirty="0" smtClean="0">
-                <a:latin typeface="Courier New" pitchFamily="49" charset="0"/>
-                <a:cs typeface="Courier New" pitchFamily="49" charset="0"/>
-              </a:rPr>
-              <a:t> </a:t>
-            </a:r>
-            <a:r>
-              <a:rPr lang="en-GB" altLang="en-US" sz="2000" dirty="0" err="1" smtClean="0">
-                <a:latin typeface="Courier New" pitchFamily="49" charset="0"/>
-                <a:cs typeface="Courier New" pitchFamily="49" charset="0"/>
-              </a:rPr>
-              <a:t>i</a:t>
-            </a:r>
-            <a:r>
-              <a:rPr lang="en-GB" altLang="en-US" sz="2000" dirty="0" smtClean="0">
-                <a:latin typeface="Courier New" pitchFamily="49" charset="0"/>
-                <a:cs typeface="Courier New" pitchFamily="49" charset="0"/>
-              </a:rPr>
-              <a:t> </a:t>
-            </a:r>
-            <a:r>
-              <a:rPr lang="en-GB" altLang="en-US" sz="2000" b="1" dirty="0" smtClean="0">
-                <a:latin typeface="Courier New" pitchFamily="49" charset="0"/>
-                <a:cs typeface="Courier New" pitchFamily="49" charset="0"/>
-              </a:rPr>
               <a:t>in</a:t>
             </a:r>
             <a:r>
-              <a:rPr lang="en-GB" altLang="en-US" sz="2000" dirty="0" smtClean="0">
+              <a:rPr lang="en-GB" altLang="en-US" sz="2000" dirty="0">
                 <a:latin typeface="Courier New" pitchFamily="49" charset="0"/>
                 <a:cs typeface="Courier New" pitchFamily="49" charset="0"/>
               </a:rPr>
@@ -4872,42 +4844,42 @@
               <a:defRPr/>
             </a:pPr>
             <a:r>
-              <a:rPr lang="en-GB" altLang="en-US" sz="2000" b="1" dirty="0" smtClean="0">
+              <a:rPr lang="en-GB" altLang="en-US" sz="2000" b="1" dirty="0">
                 <a:latin typeface="Courier New" pitchFamily="49" charset="0"/>
                 <a:cs typeface="Courier New" pitchFamily="49" charset="0"/>
               </a:rPr>
               <a:t>&gt;&gt;&gt;</a:t>
             </a:r>
             <a:r>
-              <a:rPr lang="en-GB" altLang="en-US" sz="2000" dirty="0" smtClean="0">
+              <a:rPr lang="en-GB" altLang="en-US" sz="2000" dirty="0">
                 <a:latin typeface="Courier New" pitchFamily="49" charset="0"/>
                 <a:cs typeface="Courier New" pitchFamily="49" charset="0"/>
               </a:rPr>
               <a:t> </a:t>
             </a:r>
             <a:r>
-              <a:rPr lang="en-GB" altLang="en-US" sz="2000" dirty="0" err="1" smtClean="0">
+              <a:rPr lang="en-GB" altLang="en-US" sz="2000" dirty="0" err="1">
                 <a:latin typeface="Courier New" pitchFamily="49" charset="0"/>
                 <a:cs typeface="Courier New" pitchFamily="49" charset="0"/>
               </a:rPr>
               <a:t>random.shuffle</a:t>
             </a:r>
             <a:r>
-              <a:rPr lang="en-GB" altLang="en-US" sz="2000" dirty="0" smtClean="0">
+              <a:rPr lang="en-GB" altLang="en-US" sz="2000" dirty="0">
                 <a:latin typeface="Courier New" pitchFamily="49" charset="0"/>
                 <a:cs typeface="Courier New" pitchFamily="49" charset="0"/>
               </a:rPr>
               <a:t>(</a:t>
             </a:r>
             <a:r>
-              <a:rPr lang="en-GB" altLang="en-US" sz="2000" dirty="0" err="1" smtClean="0">
+              <a:rPr lang="en-GB" altLang="en-US" sz="2000" dirty="0" err="1">
                 <a:latin typeface="Courier New" pitchFamily="49" charset="0"/>
                 <a:cs typeface="Courier New" pitchFamily="49" charset="0"/>
               </a:rPr>
               <a:t>my_data</a:t>
             </a:r>
             <a:r>
-              <a:rPr lang="en-GB" altLang="en-US" sz="2000" dirty="0" smtClean="0">
+              <a:rPr lang="en-GB" altLang="en-US" sz="2000" dirty="0">
                 <a:latin typeface="Courier New" pitchFamily="49" charset="0"/>
                 <a:cs typeface="Courier New" pitchFamily="49" charset="0"/>
               </a:rPr>
@@ -4927,56 +4899,101 @@
               <a:defRPr/>
             </a:pPr>
             <a:r>
-              <a:rPr lang="en-GB" altLang="en-US" sz="2000" b="1" dirty="0" smtClean="0">
+              <a:rPr lang="en-GB" altLang="en-US" sz="2000" b="1" dirty="0">
                 <a:latin typeface="Courier New" pitchFamily="49" charset="0"/>
                 <a:cs typeface="Courier New" pitchFamily="49" charset="0"/>
               </a:rPr>
               <a:t>&gt;&gt;&gt;</a:t>
             </a:r>
             <a:r>
-              <a:rPr lang="en-GB" altLang="en-US" sz="2000" dirty="0" smtClean="0">
+              <a:rPr lang="en-GB" altLang="en-US" sz="2000" dirty="0">
                 <a:latin typeface="Courier New" pitchFamily="49" charset="0"/>
                 <a:cs typeface="Courier New" pitchFamily="49" charset="0"/>
               </a:rPr>
               <a:t> </a:t>
             </a:r>
             <a:r>
-              <a:rPr lang="en-GB" altLang="en-US" sz="2000" dirty="0" err="1" smtClean="0">
+              <a:rPr lang="en-GB" altLang="en-US" sz="2000" dirty="0" err="1">
                 <a:latin typeface="Courier New" pitchFamily="49" charset="0"/>
                 <a:cs typeface="Courier New" pitchFamily="49" charset="0"/>
               </a:rPr>
               <a:t>binary_data</a:t>
             </a:r>
             <a:r>
-              <a:rPr lang="en-GB" altLang="en-US" sz="2000" dirty="0" smtClean="0">
+              <a:rPr lang="en-GB" altLang="en-US" sz="2000" dirty="0">
                 <a:latin typeface="Courier New" pitchFamily="49" charset="0"/>
                 <a:cs typeface="Courier New" pitchFamily="49" charset="0"/>
               </a:rPr>
               <a:t> = </a:t>
             </a:r>
             <a:r>
-              <a:rPr lang="en-GB" altLang="en-US" sz="2000" dirty="0" err="1" smtClean="0">
+              <a:rPr lang="en-GB" altLang="en-US" sz="2000" dirty="0" err="1">
                 <a:latin typeface="Courier New" pitchFamily="49" charset="0"/>
                 <a:cs typeface="Courier New" pitchFamily="49" charset="0"/>
               </a:rPr>
               <a:t>struct.pack</a:t>
             </a:r>
             <a:r>
-              <a:rPr lang="en-GB" altLang="en-US" sz="2000" dirty="0" smtClean="0">
+              <a:rPr lang="en-GB" altLang="en-US" sz="2000">
                 <a:latin typeface="Courier New" pitchFamily="49" charset="0"/>
                 <a:cs typeface="Courier New" pitchFamily="49" charset="0"/>
               </a:rPr>
-              <a:t>('f' * n, *</a:t>
-            </a:r>
-            <a:r>
-              <a:rPr lang="en-GB" altLang="en-US" sz="2000" dirty="0" err="1" smtClean="0">
+              <a:t>(</a:t>
+            </a:r>
+            <a:r>
+              <a:rPr lang="en-GB" altLang="en-US" sz="2000">
+                <a:solidFill>
+                  <a:schemeClr val="tx2">
+                    <a:lumMod val="50000"/>
+                  </a:schemeClr>
+                </a:solidFill>
                 <a:latin typeface="Courier New" pitchFamily="49" charset="0"/>
                 <a:cs typeface="Courier New" pitchFamily="49" charset="0"/>
               </a:rPr>
+              <a:t>"</a:t>
+            </a:r>
+            <a:r>
+              <a:rPr lang="en-GB" altLang="en-US" sz="2000">
+                <a:latin typeface="Courier New" pitchFamily="49" charset="0"/>
+                <a:cs typeface="Courier New" pitchFamily="49" charset="0"/>
+              </a:rPr>
+              <a:t>f</a:t>
+            </a:r>
+            <a:r>
+              <a:rPr lang="en-GB" altLang="en-US" sz="2000">
+                <a:solidFill>
+                  <a:schemeClr val="tx2">
+                    <a:lumMod val="50000"/>
+                  </a:schemeClr>
+                </a:solidFill>
+                <a:latin typeface="Courier New" pitchFamily="49" charset="0"/>
+                <a:cs typeface="Courier New" pitchFamily="49" charset="0"/>
+              </a:rPr>
+              <a:t>"</a:t>
+            </a:r>
+            <a:r>
+              <a:rPr lang="en-GB" altLang="en-US" sz="2000">
+                <a:latin typeface="Courier New" pitchFamily="49" charset="0"/>
+                <a:cs typeface="Courier New" pitchFamily="49" charset="0"/>
+              </a:rPr>
+              <a:t> </a:t>
+            </a:r>
+            <a:r>
+              <a:rPr lang="en-GB" altLang="en-US" sz="2000" dirty="0">
+                <a:latin typeface="Courier New" pitchFamily="49" charset="0"/>
+                <a:cs typeface="Courier New" pitchFamily="49" charset="0"/>
+              </a:rPr>
+              <a:t>* n, *</a:t>
+            </a:r>
+            <a:r>
+              <a:rPr lang="en-GB" altLang="en-US" sz="2000" dirty="0" err="1">
+                <a:latin typeface="Courier New" pitchFamily="49" charset="0"/>
+                <a:cs typeface="Courier New" pitchFamily="49" charset="0"/>
+              </a:rPr>
               <a:t>my_data</a:t>
             </a:r>
             <a:r>
-              <a:rPr lang="en-GB" altLang="en-US" sz="2000" dirty="0" smtClean="0">
+              <a:rPr lang="en-GB" altLang="en-US" sz="2000" dirty="0">
                 <a:latin typeface="Courier New" pitchFamily="49" charset="0"/>
                 <a:cs typeface="Courier New" pitchFamily="49" charset="0"/>
               </a:rPr>
@@ -4995,7 +5012,7 @@
               <a:buNone/>
               <a:defRPr/>
             </a:pPr>
-            <a:endParaRPr lang="en-GB" altLang="en-US" sz="2000" dirty="0" smtClean="0">
+            <a:endParaRPr lang="en-GB" altLang="en-US" sz="2000" dirty="0">
               <a:latin typeface="Courier New" pitchFamily="49" charset="0"/>
               <a:cs typeface="Courier New" pitchFamily="49" charset="0"/>
             </a:endParaRPr>
@@ -5013,7 +5030,7 @@
               <a:defRPr/>
             </a:pPr>
             <a:r>
-              <a:rPr lang="en-GB" altLang="en-US" sz="2000" b="1" dirty="0" smtClean="0">
+              <a:rPr lang="en-GB" altLang="en-US" sz="2000" b="1" dirty="0">
                 <a:solidFill>
                   <a:schemeClr val="tx2">
                     <a:lumMod val="50000"/>
@@ -5025,7 +5042,7 @@
               <a:t>&gt;&gt;&gt;</a:t>
             </a:r>
             <a:r>
-              <a:rPr lang="en-GB" altLang="en-US" sz="2000" dirty="0" smtClean="0">
+              <a:rPr lang="en-GB" altLang="en-US" sz="2000" dirty="0">
                 <a:solidFill>
                   <a:schemeClr val="tx2">
                     <a:lumMod val="50000"/>
@@ -5037,7 +5054,7 @@
               <a:t> </a:t>
             </a:r>
             <a:r>
-              <a:rPr lang="en-GB" altLang="en-US" sz="2000" b="1" dirty="0" smtClean="0">
+              <a:rPr lang="en-GB" altLang="en-US" sz="2000" b="1" dirty="0">
                 <a:solidFill>
                   <a:schemeClr val="tx2">
                     <a:lumMod val="50000"/>
@@ -5049,7 +5066,7 @@
               <a:t>with</a:t>
             </a:r>
             <a:r>
-              <a:rPr lang="en-GB" altLang="en-US" sz="2000" dirty="0" smtClean="0">
+              <a:rPr lang="en-GB" altLang="en-US" sz="2000" dirty="0">
                 <a:solidFill>
                   <a:schemeClr val="tx2">
                     <a:lumMod val="50000"/>
@@ -5061,7 +5078,7 @@
               <a:t> open("output.dat", "</a:t>
             </a:r>
             <a:r>
-              <a:rPr lang="en-GB" altLang="en-US" sz="2000" dirty="0" err="1" smtClean="0">
+              <a:rPr lang="en-GB" altLang="en-US" sz="2000" dirty="0" err="1">
                 <a:solidFill>
                   <a:schemeClr val="tx2">
                     <a:lumMod val="50000"/>
@@ -5073,7 +5090,7 @@
               <a:t>wb</a:t>
             </a:r>
             <a:r>
-              <a:rPr lang="en-GB" altLang="en-US" sz="2000" dirty="0" smtClean="0">
+              <a:rPr lang="en-GB" altLang="en-US" sz="2000" dirty="0">
                 <a:solidFill>
                   <a:schemeClr val="tx2">
                     <a:lumMod val="50000"/>
@@ -5085,7 +5102,7 @@
               <a:t>") </a:t>
             </a:r>
             <a:r>
-              <a:rPr lang="en-GB" altLang="en-US" sz="2000" b="1" dirty="0" smtClean="0">
+              <a:rPr lang="en-GB" altLang="en-US" sz="2000" b="1" dirty="0">
                 <a:solidFill>
                   <a:schemeClr val="tx2">
                     <a:lumMod val="50000"/>
@@ -5097,7 +5114,7 @@
               <a:t>as</a:t>
             </a:r>
             <a:r>
-              <a:rPr lang="en-GB" altLang="en-US" sz="2000" dirty="0" smtClean="0">
+              <a:rPr lang="en-GB" altLang="en-US" sz="2000" dirty="0">
                 <a:solidFill>
                   <a:schemeClr val="tx2">
                     <a:lumMod val="50000"/>
@@ -5122,7 +5139,7 @@
               <a:defRPr/>
             </a:pPr>
             <a:r>
-              <a:rPr lang="en-GB" altLang="en-US" sz="2000" dirty="0" smtClean="0">
+              <a:rPr lang="en-GB" altLang="en-US" sz="2000" dirty="0">
                 <a:solidFill>
                   <a:schemeClr val="tx2">
                     <a:lumMod val="50000"/>
@@ -5143,10 +5160,10 @@
                 <a:latin typeface="Courier New" pitchFamily="49" charset="0"/>
                 <a:cs typeface="Courier New" pitchFamily="49" charset="0"/>
               </a:rPr>
-              <a:t>w</a:t>
-            </a:r>
-            <a:r>
-              <a:rPr lang="en-GB" altLang="en-US" sz="2000" dirty="0" err="1" smtClean="0">
+              <a:t>writer.write</a:t>
+            </a:r>
+            <a:r>
+              <a:rPr lang="en-GB" altLang="en-US" sz="2000" dirty="0">
                 <a:solidFill>
                   <a:schemeClr val="tx2">
                     <a:lumMod val="50000"/>
@@ -5155,10 +5172,10 @@
                 <a:latin typeface="Courier New" pitchFamily="49" charset="0"/>
                 <a:cs typeface="Courier New" pitchFamily="49" charset="0"/>
               </a:rPr>
-              <a:t>riter.write</a:t>
-            </a:r>
-            <a:r>
-              <a:rPr lang="en-GB" altLang="en-US" sz="2000" dirty="0" smtClean="0">
+              <a:t>(</a:t>
+            </a:r>
+            <a:r>
+              <a:rPr lang="en-GB" altLang="en-US" sz="2000" dirty="0" err="1">
                 <a:solidFill>
                   <a:schemeClr val="tx2">
                     <a:lumMod val="50000"/>
@@ -5167,22 +5184,10 @@
                 <a:latin typeface="Courier New" pitchFamily="49" charset="0"/>
                 <a:cs typeface="Courier New" pitchFamily="49" charset="0"/>
               </a:rPr>
-              <a:t>(</a:t>
-            </a:r>
-            <a:r>
-              <a:rPr lang="en-GB" altLang="en-US" sz="2000" dirty="0" err="1" smtClean="0">
-                <a:solidFill>
-                  <a:schemeClr val="tx2">
-                    <a:lumMod val="50000"/>
-                  </a:schemeClr>
-                </a:solidFill>
-                <a:latin typeface="Courier New" pitchFamily="49" charset="0"/>
-                <a:cs typeface="Courier New" pitchFamily="49" charset="0"/>
-              </a:rPr>
               <a:t>binary_data</a:t>
             </a:r>
             <a:r>
-              <a:rPr lang="en-GB" altLang="en-US" sz="2000" dirty="0" smtClean="0">
+              <a:rPr lang="en-GB" altLang="en-US" sz="2000" dirty="0">
                 <a:solidFill>
                   <a:schemeClr val="tx2">
                     <a:lumMod val="50000"/>
@@ -5206,7 +5211,7 @@
               <a:buNone/>
               <a:defRPr/>
             </a:pPr>
-            <a:endParaRPr lang="en-GB" altLang="en-US" sz="2000" dirty="0" smtClean="0">
+            <a:endParaRPr lang="en-GB" altLang="en-US" sz="2000" dirty="0">
               <a:latin typeface="Courier New" pitchFamily="49" charset="0"/>
               <a:cs typeface="Courier New" pitchFamily="49" charset="0"/>
             </a:endParaRPr>
@@ -5224,7 +5229,7 @@
               <a:defRPr/>
             </a:pPr>
             <a:r>
-              <a:rPr lang="en-GB" altLang="en-US" dirty="0" smtClean="0">
+              <a:rPr lang="en-GB" altLang="en-US" dirty="0">
                 <a:solidFill>
                   <a:srgbClr val="000000"/>
                 </a:solidFill>
@@ -5232,7 +5237,7 @@
               </a:rPr>
               <a:t>But should we? There are many reasons not to</a:t>
             </a:r>
-            <a:endParaRPr lang="en-GB" altLang="en-US" sz="2000" dirty="0" smtClean="0">
+            <a:endParaRPr lang="en-GB" altLang="en-US" sz="2000" dirty="0">
               <a:latin typeface="Courier New" pitchFamily="49" charset="0"/>
               <a:cs typeface="Courier New" pitchFamily="49" charset="0"/>
             </a:endParaRPr>
@@ -6010,19 +6015,19 @@
               <a:defRPr/>
             </a:pPr>
             <a:r>
-              <a:rPr lang="en-GB" altLang="en-US" dirty="0" smtClean="0">
+              <a:rPr lang="en-GB" altLang="en-US" dirty="0">
                 <a:cs typeface="Calibri" panose="020F0502020204030204" pitchFamily="34" charset="0"/>
               </a:rPr>
               <a:t>Every </a:t>
             </a:r>
             <a:r>
-              <a:rPr lang="en-GB" altLang="en-US" i="1" dirty="0" smtClean="0">
+              <a:rPr lang="en-GB" altLang="en-US" i="1" dirty="0">
                 <a:cs typeface="Calibri" panose="020F0502020204030204" pitchFamily="34" charset="0"/>
               </a:rPr>
               <a:t>new format </a:t>
             </a:r>
             <a:r>
-              <a:rPr lang="en-GB" altLang="en-US" dirty="0" smtClean="0">
+              <a:rPr lang="en-GB" altLang="en-US" dirty="0">
                 <a:cs typeface="Calibri" panose="020F0502020204030204" pitchFamily="34" charset="0"/>
               </a:rPr>
               <a:t>requires documentation and code to support its usage.</a:t>
@@ -6039,19 +6044,19 @@
               <a:defRPr/>
             </a:pPr>
             <a:r>
-              <a:rPr lang="en-GB" altLang="en-US" dirty="0" smtClean="0">
+              <a:rPr lang="en-GB" altLang="en-US" dirty="0">
                 <a:cs typeface="Calibri" panose="020F0502020204030204" pitchFamily="34" charset="0"/>
               </a:rPr>
               <a:t>No software exists to automatically plot or analyse the </a:t>
             </a:r>
             <a:r>
-              <a:rPr lang="en-GB" altLang="en-US" i="1" dirty="0" smtClean="0">
+              <a:rPr lang="en-GB" altLang="en-US" i="1" dirty="0">
                 <a:cs typeface="Calibri" panose="020F0502020204030204" pitchFamily="34" charset="0"/>
               </a:rPr>
               <a:t>new format</a:t>
             </a:r>
             <a:r>
-              <a:rPr lang="en-GB" altLang="en-US" dirty="0" smtClean="0">
+              <a:rPr lang="en-GB" altLang="en-US" dirty="0">
                 <a:cs typeface="Calibri" panose="020F0502020204030204" pitchFamily="34" charset="0"/>
               </a:rPr>
               <a:t>.</a:t>
@@ -6068,19 +6073,19 @@
               <a:defRPr/>
             </a:pPr>
             <a:r>
-              <a:rPr lang="en-GB" altLang="en-US" dirty="0" smtClean="0">
+              <a:rPr lang="en-GB" altLang="en-US" dirty="0">
                 <a:cs typeface="Calibri" panose="020F0502020204030204" pitchFamily="34" charset="0"/>
               </a:rPr>
               <a:t>Other scientists will not know what to do with data in this </a:t>
             </a:r>
             <a:r>
-              <a:rPr lang="en-GB" altLang="en-US" i="1" dirty="0" smtClean="0">
+              <a:rPr lang="en-GB" altLang="en-US" i="1" dirty="0">
                 <a:cs typeface="Calibri" panose="020F0502020204030204" pitchFamily="34" charset="0"/>
               </a:rPr>
               <a:t>new format</a:t>
             </a:r>
             <a:r>
-              <a:rPr lang="en-GB" altLang="en-US" dirty="0" smtClean="0">
+              <a:rPr lang="en-GB" altLang="en-US" dirty="0">
                 <a:cs typeface="Calibri" panose="020F0502020204030204" pitchFamily="34" charset="0"/>
               </a:rPr>
               <a:t>.</a:t>
@@ -6096,7 +6101,7 @@
               </a:buClr>
               <a:defRPr/>
             </a:pPr>
-            <a:endParaRPr lang="en-GB" altLang="en-US" dirty="0" smtClean="0">
+            <a:endParaRPr lang="en-GB" altLang="en-US" dirty="0">
               <a:cs typeface="Calibri" panose="020F0502020204030204" pitchFamily="34" charset="0"/>
             </a:endParaRPr>
           </a:p>
@@ -6113,7 +6118,7 @@
               <a:defRPr/>
             </a:pPr>
             <a:r>
-              <a:rPr lang="en-GB" altLang="en-US" dirty="0" smtClean="0">
+              <a:rPr lang="en-GB" altLang="en-US" dirty="0">
                 <a:cs typeface="Calibri" panose="020F0502020204030204" pitchFamily="34" charset="0"/>
               </a:rPr>
               <a:t>We strongly recommend you use NetCDF.</a:t>

</xml_diff>